<commit_message>
Updates to pdf file
</commit_message>
<xml_diff>
--- a/Suresh_Roles_Responsibilities.pptx
+++ b/Suresh_Roles_Responsibilities.pptx
@@ -218,7 +218,7 @@
           <a:p>
             <a:fld id="{E4C3FCC2-4E7A-4671-AA79-177CB194E449}" type="datetimeFigureOut">
               <a:rPr lang="en-US" smtClean="0"/>
-              <a:t>6/9/21</a:t>
+              <a:t>6/10/21</a:t>
             </a:fld>
             <a:endParaRPr lang="en-US"/>
           </a:p>
@@ -2191,7 +2191,7 @@
           <a:p>
             <a:fld id="{4744E560-77BF-4D1A-B6E7-CD55CE12B1B8}" type="datetimeFigureOut">
               <a:rPr lang="en-US" smtClean="0"/>
-              <a:t>6/9/21</a:t>
+              <a:t>6/10/21</a:t>
             </a:fld>
             <a:endParaRPr lang="en-US"/>
           </a:p>
@@ -4854,7 +4854,7 @@
                 <a:latin typeface="Verdana" panose="020B0604030504040204" pitchFamily="34" charset="0"/>
                 <a:ea typeface="Verdana" panose="020B0604030504040204" pitchFamily="34" charset="0"/>
               </a:rPr>
-              <a:t>Blue Prism (Advanced), UiPath (Beginner), Automation Anywhere (Training)</a:t>
+              <a:t>Blue Prism (Advanced), UiPath (Beginner), Automation Anywhere (Trained)</a:t>
             </a:r>
             <a:endParaRPr lang="en-US" sz="4300" dirty="0">
               <a:latin typeface="Verdana" panose="020B0604030504040204" pitchFamily="34" charset="0"/>
@@ -4884,7 +4884,7 @@
                 <a:latin typeface="Verdana" panose="020B0604030504040204" pitchFamily="34" charset="0"/>
                 <a:ea typeface="Verdana" panose="020B0604030504040204" pitchFamily="34" charset="0"/>
               </a:rPr>
-              <a:t>Pro*C , C, C++, Java, Unix, Linux, Oracle PL/SQL Core Development </a:t>
+              <a:t>Pro*C , C, C++, Java, Node Js, Unix, Linux, MySQL, Oracle PL/SQL Core Development </a:t>
             </a:r>
             <a:endParaRPr lang="en-US" sz="4400" dirty="0">
               <a:latin typeface="Verdana" panose="020B0604030504040204" pitchFamily="34" charset="0"/>
@@ -6220,7 +6220,7 @@
                 <a:latin typeface="Verdana" panose="020B0604030504040204" pitchFamily="34" charset="0"/>
                 <a:ea typeface="Verdana" panose="020B0604030504040204" pitchFamily="34" charset="0"/>
               </a:rPr>
-              <a:t>RPA Blue prism, </a:t>
+              <a:t>Big Data Testing, RPA Blue prism, </a:t>
             </a:r>
             <a:r>
               <a:rPr lang="en-US" sz="3500" dirty="0" err="1">
@@ -9294,6 +9294,15 @@
 </file>
 
 <file path=customXml/item2.xml><?xml version="1.0" encoding="utf-8"?>
+<?mso-contentType ?>
+<FormTemplates xmlns="http://schemas.microsoft.com/sharepoint/v3/contenttype/forms">
+  <Display>DocumentLibraryForm</Display>
+  <Edit>DocumentLibraryForm</Edit>
+  <New>DocumentLibraryForm</New>
+</FormTemplates>
+</file>
+
+<file path=customXml/item3.xml><?xml version="1.0" encoding="utf-8"?>
 <ct:contentTypeSchema xmlns:ct="http://schemas.microsoft.com/office/2006/metadata/contentType" xmlns:ma="http://schemas.microsoft.com/office/2006/metadata/properties/metaAttributes" ct:_="" ma:_="" ma:contentTypeName="Document" ma:contentTypeID="0x01010079F111ED35F8CC479449609E8A0923A6" ma:contentTypeVersion="11" ma:contentTypeDescription="Create a new document." ma:contentTypeScope="" ma:versionID="96291512c1ee715ab617f4c07df79fc1">
   <xsd:schema xmlns:xsd="http://www.w3.org/2001/XMLSchema" xmlns:xs="http://www.w3.org/2001/XMLSchema" xmlns:p="http://schemas.microsoft.com/office/2006/metadata/properties" xmlns:ns2="71af3243-3dd4-4a8d-8c0d-dd76da1f02a5" xmlns:ns3="16c05727-aa75-4e4a-9b5f-8a80a1165891" targetNamespace="http://schemas.microsoft.com/office/2006/metadata/properties" ma:root="true" ma:fieldsID="8256c27c40ca5c40ce1cf6c44f0205df" ns2:_="" ns3:_="">
     <xsd:import namespace="71af3243-3dd4-4a8d-8c0d-dd76da1f02a5"/>
@@ -9504,15 +9513,6 @@
 </ct:contentTypeSchema>
 </file>
 
-<file path=customXml/item3.xml><?xml version="1.0" encoding="utf-8"?>
-<?mso-contentType ?>
-<FormTemplates xmlns="http://schemas.microsoft.com/sharepoint/v3/contenttype/forms">
-  <Display>DocumentLibraryForm</Display>
-  <Edit>DocumentLibraryForm</Edit>
-  <New>DocumentLibraryForm</New>
-</FormTemplates>
-</file>
-
 <file path=customXml/itemProps1.xml><?xml version="1.0" encoding="utf-8"?>
 <ds:datastoreItem xmlns:ds="http://schemas.openxmlformats.org/officeDocument/2006/customXml" ds:itemID="{C3774A73-0280-47B7-9E46-5069D2220801}">
   <ds:schemaRefs>
@@ -9531,6 +9531,14 @@
 </file>
 
 <file path=customXml/itemProps2.xml><?xml version="1.0" encoding="utf-8"?>
+<ds:datastoreItem xmlns:ds="http://schemas.openxmlformats.org/officeDocument/2006/customXml" ds:itemID="{F7126FF7-C1F4-4C68-B9E0-A1BEBFA97A78}">
+  <ds:schemaRefs>
+    <ds:schemaRef ds:uri="http://schemas.microsoft.com/sharepoint/v3/contenttype/forms"/>
+  </ds:schemaRefs>
+</ds:datastoreItem>
+</file>
+
+<file path=customXml/itemProps3.xml><?xml version="1.0" encoding="utf-8"?>
 <ds:datastoreItem xmlns:ds="http://schemas.openxmlformats.org/officeDocument/2006/customXml" ds:itemID="{406286C1-23B0-486D-BA90-391FEFBD898C}">
   <ds:schemaRefs>
     <ds:schemaRef ds:uri="http://schemas.microsoft.com/office/2006/metadata/contentType"/>
@@ -9547,12 +9555,4 @@
     <ds:schemaRef ds:uri="http://schemas.microsoft.com/internal/obd"/>
   </ds:schemaRefs>
 </ds:datastoreItem>
-</file>
-
-<file path=customXml/itemProps3.xml><?xml version="1.0" encoding="utf-8"?>
-<ds:datastoreItem xmlns:ds="http://schemas.openxmlformats.org/officeDocument/2006/customXml" ds:itemID="{F7126FF7-C1F4-4C68-B9E0-A1BEBFA97A78}">
-  <ds:schemaRefs>
-    <ds:schemaRef ds:uri="http://schemas.microsoft.com/sharepoint/v3/contenttype/forms"/>
-  </ds:schemaRefs>
-</ds:datastoreItem>
 </file>
</xml_diff>